<commit_message>
a07 and latest lectures added.
</commit_message>
<xml_diff>
--- a/ee523/evaluation/p/ee523_project_presentation_aryan_ritwajeet_jha.pptx
+++ b/ee523/evaluation/p/ee523_project_presentation_aryan_ritwajeet_jha.pptx
@@ -228,7 +228,7 @@
           <a:p>
             <a:fld id="{D542D976-EE9F-4D81-93B4-309048736BC3}" type="datetimeFigureOut">
               <a:rPr lang="en-US" smtClean="0"/>
-              <a:t>3/25/2023</a:t>
+              <a:t>3/27/2023</a:t>
             </a:fld>
             <a:endParaRPr lang="en-US"/>
           </a:p>
@@ -405,7 +405,7 @@
           <a:p>
             <a:fld id="{10CB9D09-B8C5-4B94-B5DC-AF4ED464E025}" type="datetimeFigureOut">
               <a:rPr lang="en-US" smtClean="0"/>
-              <a:t>3/25/2023</a:t>
+              <a:t>3/26/2023</a:t>
             </a:fld>
             <a:endParaRPr lang="en-US"/>
           </a:p>

</xml_diff>

<commit_message>
fancy formatting of referred paper
</commit_message>
<xml_diff>
--- a/ee523/evaluation/p/ee523_project_presentation_aryan_ritwajeet_jha.pptx
+++ b/ee523/evaluation/p/ee523_project_presentation_aryan_ritwajeet_jha.pptx
@@ -5,15 +5,16 @@
     <p:sldMasterId id="2147483686" r:id="rId1"/>
   </p:sldMasterIdLst>
   <p:notesMasterIdLst>
-    <p:notesMasterId r:id="rId5"/>
+    <p:notesMasterId r:id="rId6"/>
   </p:notesMasterIdLst>
   <p:handoutMasterIdLst>
-    <p:handoutMasterId r:id="rId6"/>
+    <p:handoutMasterId r:id="rId7"/>
   </p:handoutMasterIdLst>
   <p:sldIdLst>
     <p:sldId id="257" r:id="rId2"/>
     <p:sldId id="276" r:id="rId3"/>
     <p:sldId id="264" r:id="rId4"/>
+    <p:sldId id="278" r:id="rId5"/>
   </p:sldIdLst>
   <p:sldSz cx="12192000" cy="6858000"/>
   <p:notesSz cx="6858000" cy="9144000"/>
@@ -228,7 +229,7 @@
           <a:p>
             <a:fld id="{D542D976-EE9F-4D81-93B4-309048736BC3}" type="datetimeFigureOut">
               <a:rPr lang="en-US" smtClean="0"/>
-              <a:t>3/27/2023</a:t>
+              <a:t>4/8/2023</a:t>
             </a:fld>
             <a:endParaRPr lang="en-US"/>
           </a:p>
@@ -405,7 +406,7 @@
           <a:p>
             <a:fld id="{10CB9D09-B8C5-4B94-B5DC-AF4ED464E025}" type="datetimeFigureOut">
               <a:rPr lang="en-US" smtClean="0"/>
-              <a:t>3/26/2023</a:t>
+              <a:t>4/8/2023</a:t>
             </a:fld>
             <a:endParaRPr lang="en-US"/>
           </a:p>
@@ -4366,48 +4367,168 @@
           </a:p>
         </p:txBody>
       </p:sp>
-      <p:sp>
-        <p:nvSpPr>
-          <p:cNvPr id="4" name="TextBox 3">
+      <p:grpSp>
+        <p:nvGrpSpPr>
+          <p:cNvPr id="7" name="Group 6">
             <a:extLst>
               <a:ext uri="{FF2B5EF4-FFF2-40B4-BE49-F238E27FC236}">
-                <a16:creationId xmlns:a16="http://schemas.microsoft.com/office/drawing/2014/main" id="{AEED74C1-3EB5-607D-C472-D4732726DE78}"/>
+                <a16:creationId xmlns:a16="http://schemas.microsoft.com/office/drawing/2014/main" id="{F6C25B18-7E7B-FEC5-51A6-2934C67B374E}"/>
               </a:ext>
             </a:extLst>
           </p:cNvPr>
-          <p:cNvSpPr txBox="1"/>
+          <p:cNvGrpSpPr/>
           <p:nvPr/>
-        </p:nvSpPr>
-        <p:spPr>
-          <a:xfrm>
-            <a:off x="595281" y="2772740"/>
-            <a:ext cx="11113949" cy="369332"/>
-          </a:xfrm>
-          <a:prstGeom prst="rect">
-            <a:avLst/>
-          </a:prstGeom>
-          <a:noFill/>
-        </p:spPr>
-        <p:txBody>
-          <a:bodyPr wrap="square" rtlCol="0">
-            <a:spAutoFit/>
-          </a:bodyPr>
-          <a:lstStyle/>
-          <a:p>
-            <a:pPr algn="r"/>
-            <a:r>
-              <a:rPr lang="en-IN" i="1" dirty="0">
-                <a:solidFill>
-                  <a:schemeClr val="bg2"/>
-                </a:solidFill>
-                <a:latin typeface="Arial" panose="020B0604020202020204" pitchFamily="34" charset="0"/>
-                <a:cs typeface="Arial" panose="020B0604020202020204" pitchFamily="34" charset="0"/>
-              </a:rPr>
-              <a:t>Chao Lu, Jennie Si, and Xiaorong Xie</a:t>
-            </a:r>
-          </a:p>
-        </p:txBody>
-      </p:sp>
+        </p:nvGrpSpPr>
+        <p:grpSpPr>
+          <a:xfrm>
+            <a:off x="527825" y="2949302"/>
+            <a:ext cx="11246949" cy="381093"/>
+            <a:chOff x="265497" y="2964292"/>
+            <a:chExt cx="11246949" cy="381093"/>
+          </a:xfrm>
+        </p:grpSpPr>
+        <p:sp>
+          <p:nvSpPr>
+            <p:cNvPr id="4" name="TextBox 3">
+              <a:extLst>
+                <a:ext uri="{FF2B5EF4-FFF2-40B4-BE49-F238E27FC236}">
+                  <a16:creationId xmlns:a16="http://schemas.microsoft.com/office/drawing/2014/main" id="{AEED74C1-3EB5-607D-C472-D4732726DE78}"/>
+                </a:ext>
+              </a:extLst>
+            </p:cNvPr>
+            <p:cNvSpPr txBox="1"/>
+            <p:nvPr/>
+          </p:nvSpPr>
+          <p:spPr>
+            <a:xfrm>
+              <a:off x="7247744" y="2976054"/>
+              <a:ext cx="4264702" cy="369331"/>
+            </a:xfrm>
+            <a:prstGeom prst="rect">
+              <a:avLst/>
+            </a:prstGeom>
+            <a:gradFill flip="none" rotWithShape="1">
+              <a:gsLst>
+                <a:gs pos="5000">
+                  <a:schemeClr val="accent1">
+                    <a:lumMod val="5000"/>
+                    <a:lumOff val="95000"/>
+                  </a:schemeClr>
+                </a:gs>
+                <a:gs pos="86000">
+                  <a:schemeClr val="accent1">
+                    <a:lumMod val="45000"/>
+                    <a:lumOff val="55000"/>
+                  </a:schemeClr>
+                </a:gs>
+                <a:gs pos="83000">
+                  <a:schemeClr val="accent1">
+                    <a:lumMod val="45000"/>
+                    <a:lumOff val="55000"/>
+                  </a:schemeClr>
+                </a:gs>
+                <a:gs pos="100000">
+                  <a:schemeClr val="accent1">
+                    <a:lumMod val="30000"/>
+                    <a:lumOff val="70000"/>
+                  </a:schemeClr>
+                </a:gs>
+              </a:gsLst>
+              <a:lin ang="5400000" scaled="1"/>
+              <a:tileRect/>
+            </a:gradFill>
+          </p:spPr>
+          <p:txBody>
+            <a:bodyPr wrap="square" rtlCol="0">
+              <a:noAutofit/>
+            </a:bodyPr>
+            <a:lstStyle/>
+            <a:p>
+              <a:pPr algn="ctr"/>
+              <a:r>
+                <a:rPr lang="en-IN" b="1" i="1" dirty="0">
+                  <a:solidFill>
+                    <a:schemeClr val="bg2"/>
+                  </a:solidFill>
+                  <a:latin typeface="Arial" panose="020B0604020202020204" pitchFamily="34" charset="0"/>
+                  <a:cs typeface="Arial" panose="020B0604020202020204" pitchFamily="34" charset="0"/>
+                </a:rPr>
+                <a:t>Chao Lu, Jennie Si, and Xiaorong Xie</a:t>
+              </a:r>
+            </a:p>
+          </p:txBody>
+        </p:sp>
+        <p:sp>
+          <p:nvSpPr>
+            <p:cNvPr id="5" name="TextBox 4">
+              <a:extLst>
+                <a:ext uri="{FF2B5EF4-FFF2-40B4-BE49-F238E27FC236}">
+                  <a16:creationId xmlns:a16="http://schemas.microsoft.com/office/drawing/2014/main" id="{3DE70CEB-F0A5-4A13-9E61-D3924D461B57}"/>
+                </a:ext>
+              </a:extLst>
+            </p:cNvPr>
+            <p:cNvSpPr txBox="1"/>
+            <p:nvPr/>
+          </p:nvSpPr>
+          <p:spPr>
+            <a:xfrm>
+              <a:off x="265497" y="2964292"/>
+              <a:ext cx="6982247" cy="369332"/>
+            </a:xfrm>
+            <a:prstGeom prst="rect">
+              <a:avLst/>
+            </a:prstGeom>
+            <a:gradFill flip="none" rotWithShape="1">
+              <a:gsLst>
+                <a:gs pos="0">
+                  <a:schemeClr val="accent6">
+                    <a:lumMod val="5000"/>
+                    <a:lumOff val="95000"/>
+                  </a:schemeClr>
+                </a:gs>
+                <a:gs pos="74000">
+                  <a:schemeClr val="accent6">
+                    <a:lumMod val="45000"/>
+                    <a:lumOff val="55000"/>
+                  </a:schemeClr>
+                </a:gs>
+                <a:gs pos="83000">
+                  <a:schemeClr val="accent6">
+                    <a:lumMod val="45000"/>
+                    <a:lumOff val="55000"/>
+                  </a:schemeClr>
+                </a:gs>
+                <a:gs pos="100000">
+                  <a:schemeClr val="accent6">
+                    <a:lumMod val="30000"/>
+                    <a:lumOff val="70000"/>
+                  </a:schemeClr>
+                </a:gs>
+              </a:gsLst>
+              <a:lin ang="5400000" scaled="1"/>
+              <a:tileRect/>
+            </a:gradFill>
+          </p:spPr>
+          <p:txBody>
+            <a:bodyPr wrap="square" rtlCol="0">
+              <a:noAutofit/>
+            </a:bodyPr>
+            <a:lstStyle/>
+            <a:p>
+              <a:r>
+                <a:rPr lang="en-IN" b="1" i="1" dirty="0">
+                  <a:solidFill>
+                    <a:schemeClr val="accent2"/>
+                  </a:solidFill>
+                  <a:latin typeface="Arial" panose="020B0604020202020204" pitchFamily="34" charset="0"/>
+                  <a:cs typeface="Arial" panose="020B0604020202020204" pitchFamily="34" charset="0"/>
+                </a:rPr>
+                <a:t>IEEE Transactions on Systems, Man and Cybernetics (2008)</a:t>
+              </a:r>
+            </a:p>
+          </p:txBody>
+        </p:sp>
+      </p:grpSp>
     </p:spTree>
     <p:extLst>
       <p:ext uri="{BB962C8B-B14F-4D97-AF65-F5344CB8AC3E}">
@@ -4848,6 +4969,268 @@
     <p:extLst>
       <p:ext uri="{BB962C8B-B14F-4D97-AF65-F5344CB8AC3E}">
         <p14:creationId xmlns:p14="http://schemas.microsoft.com/office/powerpoint/2010/main" val="3573548137"/>
+      </p:ext>
+    </p:extLst>
+  </p:cSld>
+  <p:clrMapOvr>
+    <a:masterClrMapping/>
+  </p:clrMapOvr>
+</p:sld>
+</file>
+
+<file path=ppt/slides/slide4.xml><?xml version="1.0" encoding="utf-8"?>
+<p:sld xmlns:a="http://schemas.openxmlformats.org/drawingml/2006/main" xmlns:r="http://schemas.openxmlformats.org/officeDocument/2006/relationships" xmlns:p="http://schemas.openxmlformats.org/presentationml/2006/main">
+  <p:cSld>
+    <p:spTree>
+      <p:nvGrpSpPr>
+        <p:cNvPr id="1" name=""/>
+        <p:cNvGrpSpPr/>
+        <p:nvPr/>
+      </p:nvGrpSpPr>
+      <p:grpSpPr>
+        <a:xfrm>
+          <a:off x="0" y="0"/>
+          <a:ext cx="0" cy="0"/>
+          <a:chOff x="0" y="0"/>
+          <a:chExt cx="0" cy="0"/>
+        </a:xfrm>
+      </p:grpSpPr>
+      <p:sp>
+        <p:nvSpPr>
+          <p:cNvPr id="2" name="Title 1">
+            <a:extLst>
+              <a:ext uri="{FF2B5EF4-FFF2-40B4-BE49-F238E27FC236}">
+                <a16:creationId xmlns:a16="http://schemas.microsoft.com/office/drawing/2014/main" id="{7E8EB730-B0DA-4A8F-A335-22B9758D3046}"/>
+              </a:ext>
+            </a:extLst>
+          </p:cNvPr>
+          <p:cNvSpPr>
+            <a:spLocks noGrp="1"/>
+          </p:cNvSpPr>
+          <p:nvPr>
+            <p:ph type="ctrTitle"/>
+          </p:nvPr>
+        </p:nvSpPr>
+        <p:spPr>
+          <a:xfrm>
+            <a:off x="595281" y="1650388"/>
+            <a:ext cx="11113949" cy="1137708"/>
+          </a:xfrm>
+        </p:spPr>
+        <p:txBody>
+          <a:bodyPr/>
+          <a:lstStyle/>
+          <a:p>
+            <a:r>
+              <a:rPr lang="en-IN" sz="4000" dirty="0"/>
+              <a:t>Online Learning Control by Association and Reinforcement</a:t>
+            </a:r>
+            <a:endParaRPr lang="en-US" sz="4000" b="1" dirty="0"/>
+          </a:p>
+        </p:txBody>
+      </p:sp>
+      <p:sp>
+        <p:nvSpPr>
+          <p:cNvPr id="3" name="Subtitle 2">
+            <a:extLst>
+              <a:ext uri="{FF2B5EF4-FFF2-40B4-BE49-F238E27FC236}">
+                <a16:creationId xmlns:a16="http://schemas.microsoft.com/office/drawing/2014/main" id="{2BE68964-B8D8-4EBC-B9D3-CCA6FA2AC332}"/>
+              </a:ext>
+            </a:extLst>
+          </p:cNvPr>
+          <p:cNvSpPr>
+            <a:spLocks noGrp="1"/>
+          </p:cNvSpPr>
+          <p:nvPr>
+            <p:ph type="subTitle" idx="1"/>
+          </p:nvPr>
+        </p:nvSpPr>
+        <p:spPr>
+          <a:xfrm>
+            <a:off x="1524000" y="4248485"/>
+            <a:ext cx="9144000" cy="1137708"/>
+          </a:xfrm>
+        </p:spPr>
+        <p:txBody>
+          <a:bodyPr>
+            <a:normAutofit/>
+          </a:bodyPr>
+          <a:lstStyle/>
+          <a:p>
+            <a:endParaRPr lang="en-US" sz="3600" i="1" dirty="0">
+              <a:latin typeface="Amiri" panose="00000500000000000000" pitchFamily="2" charset="-78"/>
+              <a:ea typeface="Amiri" panose="00000500000000000000" pitchFamily="2" charset="-78"/>
+              <a:cs typeface="Amiri" panose="00000500000000000000" pitchFamily="2" charset="-78"/>
+            </a:endParaRPr>
+          </a:p>
+        </p:txBody>
+      </p:sp>
+      <p:grpSp>
+        <p:nvGrpSpPr>
+          <p:cNvPr id="7" name="Group 6">
+            <a:extLst>
+              <a:ext uri="{FF2B5EF4-FFF2-40B4-BE49-F238E27FC236}">
+                <a16:creationId xmlns:a16="http://schemas.microsoft.com/office/drawing/2014/main" id="{B5961D7C-79F8-BD1E-090A-7CDCAA4C709E}"/>
+              </a:ext>
+            </a:extLst>
+          </p:cNvPr>
+          <p:cNvGrpSpPr/>
+          <p:nvPr/>
+        </p:nvGrpSpPr>
+        <p:grpSpPr>
+          <a:xfrm>
+            <a:off x="1772191" y="2896005"/>
+            <a:ext cx="8647617" cy="449782"/>
+            <a:chOff x="1500603" y="2788093"/>
+            <a:chExt cx="8647617" cy="449782"/>
+          </a:xfrm>
+        </p:grpSpPr>
+        <p:sp>
+          <p:nvSpPr>
+            <p:cNvPr id="4" name="TextBox 3">
+              <a:extLst>
+                <a:ext uri="{FF2B5EF4-FFF2-40B4-BE49-F238E27FC236}">
+                  <a16:creationId xmlns:a16="http://schemas.microsoft.com/office/drawing/2014/main" id="{AEED74C1-3EB5-607D-C472-D4732726DE78}"/>
+                </a:ext>
+              </a:extLst>
+            </p:cNvPr>
+            <p:cNvSpPr txBox="1"/>
+            <p:nvPr/>
+          </p:nvSpPr>
+          <p:spPr>
+            <a:xfrm>
+              <a:off x="6657218" y="2788093"/>
+              <a:ext cx="3491002" cy="449782"/>
+            </a:xfrm>
+            <a:prstGeom prst="rect">
+              <a:avLst/>
+            </a:prstGeom>
+            <a:gradFill flip="none" rotWithShape="1">
+              <a:gsLst>
+                <a:gs pos="0">
+                  <a:schemeClr val="accent1">
+                    <a:lumMod val="5000"/>
+                    <a:lumOff val="95000"/>
+                  </a:schemeClr>
+                </a:gs>
+                <a:gs pos="86000">
+                  <a:schemeClr val="accent1">
+                    <a:lumMod val="45000"/>
+                    <a:lumOff val="55000"/>
+                  </a:schemeClr>
+                </a:gs>
+                <a:gs pos="83000">
+                  <a:schemeClr val="accent1">
+                    <a:lumMod val="45000"/>
+                    <a:lumOff val="55000"/>
+                  </a:schemeClr>
+                </a:gs>
+                <a:gs pos="100000">
+                  <a:schemeClr val="accent1">
+                    <a:lumMod val="30000"/>
+                    <a:lumOff val="70000"/>
+                  </a:schemeClr>
+                </a:gs>
+              </a:gsLst>
+              <a:lin ang="5400000" scaled="1"/>
+              <a:tileRect/>
+            </a:gradFill>
+          </p:spPr>
+          <p:txBody>
+            <a:bodyPr wrap="square" rtlCol="0">
+              <a:noAutofit/>
+            </a:bodyPr>
+            <a:lstStyle/>
+            <a:p>
+              <a:pPr algn="r"/>
+              <a:r>
+                <a:rPr lang="en-IN" b="1" i="1" dirty="0">
+                  <a:solidFill>
+                    <a:schemeClr val="bg2"/>
+                  </a:solidFill>
+                  <a:latin typeface="Arial" panose="020B0604020202020204" pitchFamily="34" charset="0"/>
+                  <a:cs typeface="Arial" panose="020B0604020202020204" pitchFamily="34" charset="0"/>
+                </a:rPr>
+                <a:t>Jennie Si and Yu-Tsung Wang</a:t>
+              </a:r>
+            </a:p>
+          </p:txBody>
+        </p:sp>
+        <p:sp>
+          <p:nvSpPr>
+            <p:cNvPr id="5" name="TextBox 4">
+              <a:extLst>
+                <a:ext uri="{FF2B5EF4-FFF2-40B4-BE49-F238E27FC236}">
+                  <a16:creationId xmlns:a16="http://schemas.microsoft.com/office/drawing/2014/main" id="{3DE70CEB-F0A5-4A13-9E61-D3924D461B57}"/>
+                </a:ext>
+              </a:extLst>
+            </p:cNvPr>
+            <p:cNvSpPr txBox="1"/>
+            <p:nvPr/>
+          </p:nvSpPr>
+          <p:spPr>
+            <a:xfrm>
+              <a:off x="1500603" y="2788093"/>
+              <a:ext cx="5156615" cy="449782"/>
+            </a:xfrm>
+            <a:prstGeom prst="rect">
+              <a:avLst/>
+            </a:prstGeom>
+            <a:gradFill flip="none" rotWithShape="1">
+              <a:gsLst>
+                <a:gs pos="0">
+                  <a:schemeClr val="accent6">
+                    <a:lumMod val="5000"/>
+                    <a:lumOff val="95000"/>
+                  </a:schemeClr>
+                </a:gs>
+                <a:gs pos="74000">
+                  <a:schemeClr val="accent6">
+                    <a:lumMod val="45000"/>
+                    <a:lumOff val="55000"/>
+                  </a:schemeClr>
+                </a:gs>
+                <a:gs pos="83000">
+                  <a:schemeClr val="accent6">
+                    <a:lumMod val="45000"/>
+                    <a:lumOff val="55000"/>
+                  </a:schemeClr>
+                </a:gs>
+                <a:gs pos="100000">
+                  <a:schemeClr val="accent6">
+                    <a:lumMod val="30000"/>
+                    <a:lumOff val="70000"/>
+                  </a:schemeClr>
+                </a:gs>
+              </a:gsLst>
+              <a:lin ang="5400000" scaled="1"/>
+              <a:tileRect/>
+            </a:gradFill>
+          </p:spPr>
+          <p:txBody>
+            <a:bodyPr wrap="square" rtlCol="0">
+              <a:noAutofit/>
+            </a:bodyPr>
+            <a:lstStyle/>
+            <a:p>
+              <a:r>
+                <a:rPr lang="en-IN" b="1" i="1" dirty="0">
+                  <a:solidFill>
+                    <a:schemeClr val="accent2"/>
+                  </a:solidFill>
+                  <a:latin typeface="Arial" panose="020B0604020202020204" pitchFamily="34" charset="0"/>
+                  <a:cs typeface="Arial" panose="020B0604020202020204" pitchFamily="34" charset="0"/>
+                </a:rPr>
+                <a:t>IEEE Transactions on Neural Networks (2001)</a:t>
+              </a:r>
+            </a:p>
+          </p:txBody>
+        </p:sp>
+      </p:grpSp>
+    </p:spTree>
+    <p:extLst>
+      <p:ext uri="{BB962C8B-B14F-4D97-AF65-F5344CB8AC3E}">
+        <p14:creationId xmlns:p14="http://schemas.microsoft.com/office/powerpoint/2010/main" val="2329999693"/>
       </p:ext>
     </p:extLst>
   </p:cSld>

</xml_diff>

<commit_message>
Some motivation behind HDP added.
</commit_message>
<xml_diff>
--- a/ee523/evaluation/p/ee523_project_presentation_aryan_ritwajeet_jha.pptx
+++ b/ee523/evaluation/p/ee523_project_presentation_aryan_ritwajeet_jha.pptx
@@ -5,16 +5,21 @@
     <p:sldMasterId id="2147483686" r:id="rId1"/>
   </p:sldMasterIdLst>
   <p:notesMasterIdLst>
-    <p:notesMasterId r:id="rId6"/>
+    <p:notesMasterId r:id="rId11"/>
   </p:notesMasterIdLst>
   <p:handoutMasterIdLst>
-    <p:handoutMasterId r:id="rId7"/>
+    <p:handoutMasterId r:id="rId12"/>
   </p:handoutMasterIdLst>
   <p:sldIdLst>
     <p:sldId id="257" r:id="rId2"/>
     <p:sldId id="276" r:id="rId3"/>
     <p:sldId id="264" r:id="rId4"/>
     <p:sldId id="278" r:id="rId5"/>
+    <p:sldId id="280" r:id="rId6"/>
+    <p:sldId id="281" r:id="rId7"/>
+    <p:sldId id="282" r:id="rId8"/>
+    <p:sldId id="283" r:id="rId9"/>
+    <p:sldId id="279" r:id="rId10"/>
   </p:sldIdLst>
   <p:sldSz cx="12192000" cy="6858000"/>
   <p:notesSz cx="6858000" cy="9144000"/>
@@ -114,6 +119,23 @@
     </a:lvl9pPr>
   </p:defaultTextStyle>
   <p:extLst>
+    <p:ext uri="{521415D9-36F7-43E2-AB2F-B90AF26B5E84}">
+      <p14:sectionLst xmlns:p14="http://schemas.microsoft.com/office/powerpoint/2010/main">
+        <p14:section name="Default Section" id="{F11756C4-D106-4EA5-8CBA-2114D3C3C153}">
+          <p14:sldIdLst>
+            <p14:sldId id="257"/>
+            <p14:sldId id="276"/>
+            <p14:sldId id="264"/>
+            <p14:sldId id="278"/>
+            <p14:sldId id="280"/>
+            <p14:sldId id="281"/>
+            <p14:sldId id="282"/>
+            <p14:sldId id="283"/>
+            <p14:sldId id="279"/>
+          </p14:sldIdLst>
+        </p14:section>
+      </p14:sectionLst>
+    </p:ext>
     <p:ext uri="{EFAFB233-063F-42B5-8137-9DF3F51BA10A}">
       <p15:sldGuideLst xmlns:p15="http://schemas.microsoft.com/office/powerpoint/2012/main">
         <p15:guide id="1" orient="horz" pos="2160" userDrawn="1">
@@ -5047,21 +5069,140 @@
         </p:nvSpPr>
         <p:spPr>
           <a:xfrm>
-            <a:off x="1524000" y="4248485"/>
-            <a:ext cx="9144000" cy="1137708"/>
-          </a:xfrm>
-        </p:spPr>
+            <a:off x="1772191" y="4087549"/>
+            <a:ext cx="8356769" cy="1883300"/>
+          </a:xfrm>
+        </p:spPr>
+        <p:style>
+          <a:lnRef idx="2">
+            <a:schemeClr val="accent1"/>
+          </a:lnRef>
+          <a:fillRef idx="1">
+            <a:schemeClr val="lt1"/>
+          </a:fillRef>
+          <a:effectRef idx="0">
+            <a:schemeClr val="accent1"/>
+          </a:effectRef>
+          <a:fontRef idx="minor">
+            <a:schemeClr val="dk1"/>
+          </a:fontRef>
+        </p:style>
         <p:txBody>
           <a:bodyPr>
-            <a:normAutofit/>
+            <a:normAutofit fontScale="62500" lnSpcReduction="20000"/>
           </a:bodyPr>
           <a:lstStyle/>
           <a:p>
-            <a:endParaRPr lang="en-US" sz="3600" i="1" dirty="0">
+            <a:pPr algn="l"/>
+            <a:endParaRPr lang="en-US" sz="3600" dirty="0">
               <a:latin typeface="Amiri" panose="00000500000000000000" pitchFamily="2" charset="-78"/>
               <a:ea typeface="Amiri" panose="00000500000000000000" pitchFamily="2" charset="-78"/>
               <a:cs typeface="Amiri" panose="00000500000000000000" pitchFamily="2" charset="-78"/>
             </a:endParaRPr>
+          </a:p>
+          <a:p>
+            <a:pPr algn="l"/>
+            <a:r>
+              <a:rPr lang="en-US" sz="3600" dirty="0">
+                <a:latin typeface="Amiri" panose="00000500000000000000" pitchFamily="2" charset="-78"/>
+                <a:ea typeface="Amiri" panose="00000500000000000000" pitchFamily="2" charset="-78"/>
+                <a:cs typeface="Amiri" panose="00000500000000000000" pitchFamily="2" charset="-78"/>
+              </a:rPr>
+              <a:t>Among the various algorithms of </a:t>
+            </a:r>
+            <a:r>
+              <a:rPr lang="en-US" sz="3600" dirty="0">
+                <a:solidFill>
+                  <a:schemeClr val="accent2"/>
+                </a:solidFill>
+                <a:latin typeface="Amiri" panose="00000500000000000000" pitchFamily="2" charset="-78"/>
+                <a:ea typeface="Amiri" panose="00000500000000000000" pitchFamily="2" charset="-78"/>
+                <a:cs typeface="Amiri" panose="00000500000000000000" pitchFamily="2" charset="-78"/>
+              </a:rPr>
+              <a:t>Adaptive Critic Designs</a:t>
+            </a:r>
+            <a:r>
+              <a:rPr lang="en-US" sz="3600" dirty="0">
+                <a:latin typeface="Amiri" panose="00000500000000000000" pitchFamily="2" charset="-78"/>
+                <a:ea typeface="Amiri" panose="00000500000000000000" pitchFamily="2" charset="-78"/>
+                <a:cs typeface="Amiri" panose="00000500000000000000" pitchFamily="2" charset="-78"/>
+              </a:rPr>
+              <a:t>, a specific system architecture called </a:t>
+            </a:r>
+          </a:p>
+          <a:p>
+            <a:pPr algn="l"/>
+            <a:r>
+              <a:rPr lang="en-US" sz="3600" dirty="0">
+                <a:solidFill>
+                  <a:srgbClr val="FF0000"/>
+                </a:solidFill>
+                <a:latin typeface="Amiri" panose="00000500000000000000" pitchFamily="2" charset="-78"/>
+                <a:ea typeface="Amiri" panose="00000500000000000000" pitchFamily="2" charset="-78"/>
+                <a:cs typeface="Amiri" panose="00000500000000000000" pitchFamily="2" charset="-78"/>
+              </a:rPr>
+              <a:t>Action Dependent </a:t>
+            </a:r>
+            <a:r>
+              <a:rPr lang="en-US" sz="3600" dirty="0">
+                <a:solidFill>
+                  <a:schemeClr val="accent1"/>
+                </a:solidFill>
+                <a:latin typeface="Amiri" panose="00000500000000000000" pitchFamily="2" charset="-78"/>
+                <a:ea typeface="Amiri" panose="00000500000000000000" pitchFamily="2" charset="-78"/>
+                <a:cs typeface="Amiri" panose="00000500000000000000" pitchFamily="2" charset="-78"/>
+              </a:rPr>
+              <a:t>Heuristic Dynamic Programming </a:t>
+            </a:r>
+            <a:r>
+              <a:rPr lang="en-US" sz="3600" dirty="0">
+                <a:latin typeface="Amiri" panose="00000500000000000000" pitchFamily="2" charset="-78"/>
+                <a:ea typeface="Amiri" panose="00000500000000000000" pitchFamily="2" charset="-78"/>
+                <a:cs typeface="Amiri" panose="00000500000000000000" pitchFamily="2" charset="-78"/>
+              </a:rPr>
+              <a:t>(</a:t>
+            </a:r>
+            <a:r>
+              <a:rPr lang="en-US" sz="3600" dirty="0">
+                <a:solidFill>
+                  <a:srgbClr val="FF0000"/>
+                </a:solidFill>
+                <a:latin typeface="Amiri" panose="00000500000000000000" pitchFamily="2" charset="-78"/>
+                <a:ea typeface="Amiri" panose="00000500000000000000" pitchFamily="2" charset="-78"/>
+                <a:cs typeface="Amiri" panose="00000500000000000000" pitchFamily="2" charset="-78"/>
+              </a:rPr>
+              <a:t>AD</a:t>
+            </a:r>
+            <a:r>
+              <a:rPr lang="en-US" sz="3600" dirty="0">
+                <a:solidFill>
+                  <a:srgbClr val="C00000"/>
+                </a:solidFill>
+                <a:latin typeface="Amiri" panose="00000500000000000000" pitchFamily="2" charset="-78"/>
+                <a:ea typeface="Amiri" panose="00000500000000000000" pitchFamily="2" charset="-78"/>
+                <a:cs typeface="Amiri" panose="00000500000000000000" pitchFamily="2" charset="-78"/>
+              </a:rPr>
+              <a:t>HDP</a:t>
+            </a:r>
+            <a:r>
+              <a:rPr lang="en-US" sz="3600" dirty="0">
+                <a:latin typeface="Amiri" panose="00000500000000000000" pitchFamily="2" charset="-78"/>
+                <a:ea typeface="Amiri" panose="00000500000000000000" pitchFamily="2" charset="-78"/>
+                <a:cs typeface="Amiri" panose="00000500000000000000" pitchFamily="2" charset="-78"/>
+              </a:rPr>
+              <a:t>) </a:t>
+            </a:r>
+          </a:p>
+          <a:p>
+            <a:pPr algn="l"/>
+            <a:r>
+              <a:rPr lang="en-US" sz="3600" dirty="0">
+                <a:latin typeface="Amiri" panose="00000500000000000000" pitchFamily="2" charset="-78"/>
+                <a:ea typeface="Amiri" panose="00000500000000000000" pitchFamily="2" charset="-78"/>
+                <a:cs typeface="Amiri" panose="00000500000000000000" pitchFamily="2" charset="-78"/>
+              </a:rPr>
+              <a:t>for online learning control is proposed and demonstrated in this paper.</a:t>
+            </a:r>
           </a:p>
         </p:txBody>
       </p:sp>
@@ -5231,6 +5372,802 @@
     <p:extLst>
       <p:ext uri="{BB962C8B-B14F-4D97-AF65-F5344CB8AC3E}">
         <p14:creationId xmlns:p14="http://schemas.microsoft.com/office/powerpoint/2010/main" val="2329999693"/>
+      </p:ext>
+    </p:extLst>
+  </p:cSld>
+  <p:clrMapOvr>
+    <a:masterClrMapping/>
+  </p:clrMapOvr>
+</p:sld>
+</file>
+
+<file path=ppt/slides/slide5.xml><?xml version="1.0" encoding="utf-8"?>
+<p:sld xmlns:a="http://schemas.openxmlformats.org/drawingml/2006/main" xmlns:r="http://schemas.openxmlformats.org/officeDocument/2006/relationships" xmlns:p="http://schemas.openxmlformats.org/presentationml/2006/main">
+  <p:cSld>
+    <p:spTree>
+      <p:nvGrpSpPr>
+        <p:cNvPr id="1" name=""/>
+        <p:cNvGrpSpPr/>
+        <p:nvPr/>
+      </p:nvGrpSpPr>
+      <p:grpSpPr>
+        <a:xfrm>
+          <a:off x="0" y="0"/>
+          <a:ext cx="0" cy="0"/>
+          <a:chOff x="0" y="0"/>
+          <a:chExt cx="0" cy="0"/>
+        </a:xfrm>
+      </p:grpSpPr>
+      <p:sp>
+        <p:nvSpPr>
+          <p:cNvPr id="2" name="Content Placeholder 1">
+            <a:extLst>
+              <a:ext uri="{FF2B5EF4-FFF2-40B4-BE49-F238E27FC236}">
+                <a16:creationId xmlns:a16="http://schemas.microsoft.com/office/drawing/2014/main" id="{DDBFA327-8206-C884-2C49-0363335E5BE7}"/>
+              </a:ext>
+            </a:extLst>
+          </p:cNvPr>
+          <p:cNvSpPr>
+            <a:spLocks noGrp="1"/>
+          </p:cNvSpPr>
+          <p:nvPr>
+            <p:ph idx="1"/>
+          </p:nvPr>
+        </p:nvSpPr>
+        <p:spPr>
+          <a:xfrm>
+            <a:off x="1781174" y="2229633"/>
+            <a:ext cx="9348789" cy="3581620"/>
+          </a:xfrm>
+          <a:solidFill>
+            <a:schemeClr val="accent4">
+              <a:lumMod val="20000"/>
+              <a:lumOff val="80000"/>
+            </a:schemeClr>
+          </a:solidFill>
+        </p:spPr>
+        <p:txBody>
+          <a:bodyPr/>
+          <a:lstStyle/>
+          <a:p>
+            <a:r>
+              <a:rPr lang="en-IN" dirty="0"/>
+              <a:t>Domain: A class of learning decision and control problems where the environment/system that interacts with the ‘learner’ is NOT known beforehand. </a:t>
+            </a:r>
+          </a:p>
+          <a:p>
+            <a:r>
+              <a:rPr lang="en-IN" dirty="0"/>
+              <a:t>Environment: The environment can be Stochastic, Non-Linear and Subject to change over time. </a:t>
+            </a:r>
+            <a:r>
+              <a:rPr lang="en-IN" b="1" dirty="0">
+                <a:solidFill>
+                  <a:srgbClr val="FF0000"/>
+                </a:solidFill>
+              </a:rPr>
+              <a:t>(PUT AN EXAMPLE)</a:t>
+            </a:r>
+          </a:p>
+          <a:p>
+            <a:r>
+              <a:rPr lang="en-IN" dirty="0"/>
+              <a:t>Problem Statement: Devise a control learning algorithm which optimizes some sort of figure of merit over time. </a:t>
+            </a:r>
+            <a:r>
+              <a:rPr lang="en-IN" b="1" dirty="0">
+                <a:solidFill>
+                  <a:srgbClr val="FF0000"/>
+                </a:solidFill>
+              </a:rPr>
+              <a:t>(PUT AN EXAMPLE)</a:t>
+            </a:r>
+          </a:p>
+          <a:p>
+            <a:pPr marL="0" indent="0">
+              <a:buNone/>
+            </a:pPr>
+            <a:endParaRPr lang="en-IN" b="1" dirty="0">
+              <a:solidFill>
+                <a:srgbClr val="FF0000"/>
+              </a:solidFill>
+            </a:endParaRPr>
+          </a:p>
+          <a:p>
+            <a:endParaRPr lang="en-IN" dirty="0"/>
+          </a:p>
+        </p:txBody>
+      </p:sp>
+      <p:sp>
+        <p:nvSpPr>
+          <p:cNvPr id="3" name="Title 2">
+            <a:extLst>
+              <a:ext uri="{FF2B5EF4-FFF2-40B4-BE49-F238E27FC236}">
+                <a16:creationId xmlns:a16="http://schemas.microsoft.com/office/drawing/2014/main" id="{B0436C36-C793-8D40-5089-7E6395E0BDB9}"/>
+              </a:ext>
+            </a:extLst>
+          </p:cNvPr>
+          <p:cNvSpPr>
+            <a:spLocks noGrp="1"/>
+          </p:cNvSpPr>
+          <p:nvPr>
+            <p:ph type="title"/>
+          </p:nvPr>
+        </p:nvSpPr>
+        <p:spPr/>
+        <p:txBody>
+          <a:bodyPr/>
+          <a:lstStyle/>
+          <a:p>
+            <a:r>
+              <a:rPr lang="en-IN" dirty="0"/>
+              <a:t>Motivation behind Heuristic Dynamic Programming</a:t>
+            </a:r>
+          </a:p>
+        </p:txBody>
+      </p:sp>
+    </p:spTree>
+    <p:extLst>
+      <p:ext uri="{BB962C8B-B14F-4D97-AF65-F5344CB8AC3E}">
+        <p14:creationId xmlns:p14="http://schemas.microsoft.com/office/powerpoint/2010/main" val="1509933829"/>
+      </p:ext>
+    </p:extLst>
+  </p:cSld>
+  <p:clrMapOvr>
+    <a:masterClrMapping/>
+  </p:clrMapOvr>
+</p:sld>
+</file>
+
+<file path=ppt/slides/slide6.xml><?xml version="1.0" encoding="utf-8"?>
+<p:sld xmlns:a="http://schemas.openxmlformats.org/drawingml/2006/main" xmlns:r="http://schemas.openxmlformats.org/officeDocument/2006/relationships" xmlns:p="http://schemas.openxmlformats.org/presentationml/2006/main">
+  <p:cSld>
+    <p:spTree>
+      <p:nvGrpSpPr>
+        <p:cNvPr id="1" name=""/>
+        <p:cNvGrpSpPr/>
+        <p:nvPr/>
+      </p:nvGrpSpPr>
+      <p:grpSpPr>
+        <a:xfrm>
+          <a:off x="0" y="0"/>
+          <a:ext cx="0" cy="0"/>
+          <a:chOff x="0" y="0"/>
+          <a:chExt cx="0" cy="0"/>
+        </a:xfrm>
+      </p:grpSpPr>
+      <p:sp>
+        <p:nvSpPr>
+          <p:cNvPr id="2" name="Content Placeholder 1">
+            <a:extLst>
+              <a:ext uri="{FF2B5EF4-FFF2-40B4-BE49-F238E27FC236}">
+                <a16:creationId xmlns:a16="http://schemas.microsoft.com/office/drawing/2014/main" id="{DDBFA327-8206-C884-2C49-0363335E5BE7}"/>
+              </a:ext>
+            </a:extLst>
+          </p:cNvPr>
+          <p:cNvSpPr>
+            <a:spLocks noGrp="1"/>
+          </p:cNvSpPr>
+          <p:nvPr>
+            <p:ph idx="1"/>
+          </p:nvPr>
+        </p:nvSpPr>
+        <p:spPr>
+          <a:xfrm>
+            <a:off x="1781174" y="2229633"/>
+            <a:ext cx="9348789" cy="3581620"/>
+          </a:xfrm>
+          <a:solidFill>
+            <a:schemeClr val="accent4">
+              <a:lumMod val="20000"/>
+              <a:lumOff val="80000"/>
+            </a:schemeClr>
+          </a:solidFill>
+        </p:spPr>
+        <p:txBody>
+          <a:bodyPr/>
+          <a:lstStyle/>
+          <a:p>
+            <a:r>
+              <a:rPr lang="en-IN" dirty="0"/>
+              <a:t>Learning Timeline: ‘On-the-fly’ i.e. Online learning during interaction with the environment itself. </a:t>
+            </a:r>
+          </a:p>
+          <a:p>
+            <a:r>
+              <a:rPr lang="en-IN" dirty="0"/>
+              <a:t>Learning Outcome: While measurements from the environment are available from one decision and control step to the next, a final outcome of the learning process from a generated sequence of decisions and controls may come as a delayed signal in only an indicative ‘win’ or ‘lose’ format.	</a:t>
+            </a:r>
+            <a:endParaRPr lang="en-IN" b="1" dirty="0">
+              <a:solidFill>
+                <a:srgbClr val="FF0000"/>
+              </a:solidFill>
+            </a:endParaRPr>
+          </a:p>
+          <a:p>
+            <a:endParaRPr lang="en-IN" dirty="0"/>
+          </a:p>
+        </p:txBody>
+      </p:sp>
+      <p:sp>
+        <p:nvSpPr>
+          <p:cNvPr id="3" name="Title 2">
+            <a:extLst>
+              <a:ext uri="{FF2B5EF4-FFF2-40B4-BE49-F238E27FC236}">
+                <a16:creationId xmlns:a16="http://schemas.microsoft.com/office/drawing/2014/main" id="{B0436C36-C793-8D40-5089-7E6395E0BDB9}"/>
+              </a:ext>
+            </a:extLst>
+          </p:cNvPr>
+          <p:cNvSpPr>
+            <a:spLocks noGrp="1"/>
+          </p:cNvSpPr>
+          <p:nvPr>
+            <p:ph type="title"/>
+          </p:nvPr>
+        </p:nvSpPr>
+        <p:spPr/>
+        <p:txBody>
+          <a:bodyPr/>
+          <a:lstStyle/>
+          <a:p>
+            <a:r>
+              <a:rPr lang="en-IN" dirty="0"/>
+              <a:t>Motivation behind Heuristic Dynamic Programming</a:t>
+            </a:r>
+          </a:p>
+        </p:txBody>
+      </p:sp>
+    </p:spTree>
+    <p:extLst>
+      <p:ext uri="{BB962C8B-B14F-4D97-AF65-F5344CB8AC3E}">
+        <p14:creationId xmlns:p14="http://schemas.microsoft.com/office/powerpoint/2010/main" val="3777644098"/>
+      </p:ext>
+    </p:extLst>
+  </p:cSld>
+  <p:clrMapOvr>
+    <a:masterClrMapping/>
+  </p:clrMapOvr>
+</p:sld>
+</file>
+
+<file path=ppt/slides/slide7.xml><?xml version="1.0" encoding="utf-8"?>
+<p:sld xmlns:a="http://schemas.openxmlformats.org/drawingml/2006/main" xmlns:r="http://schemas.openxmlformats.org/officeDocument/2006/relationships" xmlns:p="http://schemas.openxmlformats.org/presentationml/2006/main">
+  <p:cSld>
+    <p:spTree>
+      <p:nvGrpSpPr>
+        <p:cNvPr id="1" name=""/>
+        <p:cNvGrpSpPr/>
+        <p:nvPr/>
+      </p:nvGrpSpPr>
+      <p:grpSpPr>
+        <a:xfrm>
+          <a:off x="0" y="0"/>
+          <a:ext cx="0" cy="0"/>
+          <a:chOff x="0" y="0"/>
+          <a:chExt cx="0" cy="0"/>
+        </a:xfrm>
+      </p:grpSpPr>
+      <p:sp>
+        <p:nvSpPr>
+          <p:cNvPr id="2" name="Content Placeholder 1">
+            <a:extLst>
+              <a:ext uri="{FF2B5EF4-FFF2-40B4-BE49-F238E27FC236}">
+                <a16:creationId xmlns:a16="http://schemas.microsoft.com/office/drawing/2014/main" id="{DDBFA327-8206-C884-2C49-0363335E5BE7}"/>
+              </a:ext>
+            </a:extLst>
+          </p:cNvPr>
+          <p:cNvSpPr>
+            <a:spLocks noGrp="1"/>
+          </p:cNvSpPr>
+          <p:nvPr>
+            <p:ph idx="1"/>
+          </p:nvPr>
+        </p:nvSpPr>
+        <p:spPr>
+          <a:xfrm>
+            <a:off x="1781175" y="2077081"/>
+            <a:ext cx="4232066" cy="4347942"/>
+          </a:xfrm>
+          <a:solidFill>
+            <a:schemeClr val="accent4">
+              <a:lumMod val="20000"/>
+              <a:lumOff val="80000"/>
+            </a:schemeClr>
+          </a:solidFill>
+        </p:spPr>
+        <p:txBody>
+          <a:bodyPr/>
+          <a:lstStyle/>
+          <a:p>
+            <a:r>
+              <a:rPr lang="en-IN" dirty="0"/>
+              <a:t>Reinforcement Learning (RL) has garnered great intuitive appeal for solving such class of problems, especially since the implementation of Temporal Difference (TD) Learning Method. Noteworthy example: TD-Gammon program has learnt to play Backgammon at a grandmaster level.</a:t>
+            </a:r>
+          </a:p>
+          <a:p>
+            <a:endParaRPr lang="en-IN" dirty="0"/>
+          </a:p>
+        </p:txBody>
+      </p:sp>
+      <p:sp>
+        <p:nvSpPr>
+          <p:cNvPr id="3" name="Title 2">
+            <a:extLst>
+              <a:ext uri="{FF2B5EF4-FFF2-40B4-BE49-F238E27FC236}">
+                <a16:creationId xmlns:a16="http://schemas.microsoft.com/office/drawing/2014/main" id="{B0436C36-C793-8D40-5089-7E6395E0BDB9}"/>
+              </a:ext>
+            </a:extLst>
+          </p:cNvPr>
+          <p:cNvSpPr>
+            <a:spLocks noGrp="1"/>
+          </p:cNvSpPr>
+          <p:nvPr>
+            <p:ph type="title"/>
+          </p:nvPr>
+        </p:nvSpPr>
+        <p:spPr/>
+        <p:txBody>
+          <a:bodyPr/>
+          <a:lstStyle/>
+          <a:p>
+            <a:r>
+              <a:rPr lang="en-IN" dirty="0"/>
+              <a:t>Motivation behind Heuristic Dynamic Programming</a:t>
+            </a:r>
+          </a:p>
+        </p:txBody>
+      </p:sp>
+      <p:pic>
+        <p:nvPicPr>
+          <p:cNvPr id="5" name="Picture 4" descr="A screenshot of a game&#10;&#10;Description automatically generated with medium confidence">
+            <a:extLst>
+              <a:ext uri="{FF2B5EF4-FFF2-40B4-BE49-F238E27FC236}">
+                <a16:creationId xmlns:a16="http://schemas.microsoft.com/office/drawing/2014/main" id="{E17FA481-0C09-51FC-1880-91B30CED4F29}"/>
+              </a:ext>
+            </a:extLst>
+          </p:cNvPr>
+          <p:cNvPicPr>
+            <a:picLocks noChangeAspect="1"/>
+          </p:cNvPicPr>
+          <p:nvPr/>
+        </p:nvPicPr>
+        <p:blipFill>
+          <a:blip r:embed="rId2">
+            <a:extLst>
+              <a:ext uri="{28A0092B-C50C-407E-A947-70E740481C1C}">
+                <a14:useLocalDpi xmlns:a14="http://schemas.microsoft.com/office/drawing/2010/main" val="0"/>
+              </a:ext>
+            </a:extLst>
+          </a:blip>
+          <a:stretch>
+            <a:fillRect/>
+          </a:stretch>
+        </p:blipFill>
+        <p:spPr>
+          <a:xfrm>
+            <a:off x="6358191" y="2299311"/>
+            <a:ext cx="5653414" cy="3635206"/>
+          </a:xfrm>
+          <a:prstGeom prst="rect">
+            <a:avLst/>
+          </a:prstGeom>
+        </p:spPr>
+      </p:pic>
+    </p:spTree>
+    <p:extLst>
+      <p:ext uri="{BB962C8B-B14F-4D97-AF65-F5344CB8AC3E}">
+        <p14:creationId xmlns:p14="http://schemas.microsoft.com/office/powerpoint/2010/main" val="4201608016"/>
+      </p:ext>
+    </p:extLst>
+  </p:cSld>
+  <p:clrMapOvr>
+    <a:masterClrMapping/>
+  </p:clrMapOvr>
+</p:sld>
+</file>
+
+<file path=ppt/slides/slide8.xml><?xml version="1.0" encoding="utf-8"?>
+<p:sld xmlns:a="http://schemas.openxmlformats.org/drawingml/2006/main" xmlns:r="http://schemas.openxmlformats.org/officeDocument/2006/relationships" xmlns:p="http://schemas.openxmlformats.org/presentationml/2006/main">
+  <p:cSld>
+    <p:spTree>
+      <p:nvGrpSpPr>
+        <p:cNvPr id="1" name=""/>
+        <p:cNvGrpSpPr/>
+        <p:nvPr/>
+      </p:nvGrpSpPr>
+      <p:grpSpPr>
+        <a:xfrm>
+          <a:off x="0" y="0"/>
+          <a:ext cx="0" cy="0"/>
+          <a:chOff x="0" y="0"/>
+          <a:chExt cx="0" cy="0"/>
+        </a:xfrm>
+      </p:grpSpPr>
+      <p:sp>
+        <p:nvSpPr>
+          <p:cNvPr id="2" name="Content Placeholder 1">
+            <a:extLst>
+              <a:ext uri="{FF2B5EF4-FFF2-40B4-BE49-F238E27FC236}">
+                <a16:creationId xmlns:a16="http://schemas.microsoft.com/office/drawing/2014/main" id="{DDBFA327-8206-C884-2C49-0363335E5BE7}"/>
+              </a:ext>
+            </a:extLst>
+          </p:cNvPr>
+          <p:cNvSpPr>
+            <a:spLocks noGrp="1"/>
+          </p:cNvSpPr>
+          <p:nvPr>
+            <p:ph idx="1"/>
+          </p:nvPr>
+        </p:nvSpPr>
+        <p:spPr>
+          <a:xfrm>
+            <a:off x="1781174" y="2229633"/>
+            <a:ext cx="9348789" cy="4195390"/>
+          </a:xfrm>
+          <a:solidFill>
+            <a:schemeClr val="accent4">
+              <a:lumMod val="20000"/>
+              <a:lumOff val="80000"/>
+            </a:schemeClr>
+          </a:solidFill>
+        </p:spPr>
+        <p:txBody>
+          <a:bodyPr/>
+          <a:lstStyle/>
+          <a:p>
+            <a:r>
+              <a:rPr lang="en-IN" dirty="0">
+                <a:solidFill>
+                  <a:schemeClr val="tx1"/>
+                </a:solidFill>
+              </a:rPr>
+              <a:t>RL excels in Markovian Environments compared to traditional Supervised and Unsupervised Machine Learning Algorithms.</a:t>
+            </a:r>
+          </a:p>
+          <a:p>
+            <a:r>
+              <a:rPr lang="en-IN" dirty="0">
+                <a:solidFill>
+                  <a:schemeClr val="tx1"/>
+                </a:solidFill>
+              </a:rPr>
+              <a:t>Markovian Environment: An environment where a system’s next state is dependent on the current control step as well as the previous N states of the system.</a:t>
+            </a:r>
+          </a:p>
+          <a:p>
+            <a:endParaRPr lang="en-IN" dirty="0"/>
+          </a:p>
+        </p:txBody>
+      </p:sp>
+      <p:sp>
+        <p:nvSpPr>
+          <p:cNvPr id="3" name="Title 2">
+            <a:extLst>
+              <a:ext uri="{FF2B5EF4-FFF2-40B4-BE49-F238E27FC236}">
+                <a16:creationId xmlns:a16="http://schemas.microsoft.com/office/drawing/2014/main" id="{B0436C36-C793-8D40-5089-7E6395E0BDB9}"/>
+              </a:ext>
+            </a:extLst>
+          </p:cNvPr>
+          <p:cNvSpPr>
+            <a:spLocks noGrp="1"/>
+          </p:cNvSpPr>
+          <p:nvPr>
+            <p:ph type="title"/>
+          </p:nvPr>
+        </p:nvSpPr>
+        <p:spPr/>
+        <p:txBody>
+          <a:bodyPr/>
+          <a:lstStyle/>
+          <a:p>
+            <a:r>
+              <a:rPr lang="en-IN" dirty="0"/>
+              <a:t>Motivation behind Heuristic Dynamic Programming</a:t>
+            </a:r>
+          </a:p>
+        </p:txBody>
+      </p:sp>
+    </p:spTree>
+    <p:extLst>
+      <p:ext uri="{BB962C8B-B14F-4D97-AF65-F5344CB8AC3E}">
+        <p14:creationId xmlns:p14="http://schemas.microsoft.com/office/powerpoint/2010/main" val="3348736013"/>
+      </p:ext>
+    </p:extLst>
+  </p:cSld>
+  <p:clrMapOvr>
+    <a:masterClrMapping/>
+  </p:clrMapOvr>
+</p:sld>
+</file>
+
+<file path=ppt/slides/slide9.xml><?xml version="1.0" encoding="utf-8"?>
+<p:sld xmlns:a="http://schemas.openxmlformats.org/drawingml/2006/main" xmlns:r="http://schemas.openxmlformats.org/officeDocument/2006/relationships" xmlns:p="http://schemas.openxmlformats.org/presentationml/2006/main">
+  <p:cSld>
+    <p:spTree>
+      <p:nvGrpSpPr>
+        <p:cNvPr id="1" name=""/>
+        <p:cNvGrpSpPr/>
+        <p:nvPr/>
+      </p:nvGrpSpPr>
+      <p:grpSpPr>
+        <a:xfrm>
+          <a:off x="0" y="0"/>
+          <a:ext cx="0" cy="0"/>
+          <a:chOff x="0" y="0"/>
+          <a:chExt cx="0" cy="0"/>
+        </a:xfrm>
+      </p:grpSpPr>
+      <p:sp>
+        <p:nvSpPr>
+          <p:cNvPr id="2" name="Content Placeholder 1">
+            <a:extLst>
+              <a:ext uri="{FF2B5EF4-FFF2-40B4-BE49-F238E27FC236}">
+                <a16:creationId xmlns:a16="http://schemas.microsoft.com/office/drawing/2014/main" id="{5D5DC3B6-A4C9-1B5F-D473-B43998D916EA}"/>
+              </a:ext>
+            </a:extLst>
+          </p:cNvPr>
+          <p:cNvSpPr>
+            <a:spLocks noGrp="1"/>
+          </p:cNvSpPr>
+          <p:nvPr>
+            <p:ph idx="1"/>
+          </p:nvPr>
+        </p:nvSpPr>
+        <p:spPr/>
+        <p:txBody>
+          <a:bodyPr/>
+          <a:lstStyle/>
+          <a:p>
+            <a:r>
+              <a:rPr lang="en-US" sz="2800" dirty="0">
+                <a:latin typeface="Amiri" panose="00000500000000000000" pitchFamily="2" charset="-78"/>
+                <a:ea typeface="Amiri" panose="00000500000000000000" pitchFamily="2" charset="-78"/>
+                <a:cs typeface="Amiri" panose="00000500000000000000" pitchFamily="2" charset="-78"/>
+              </a:rPr>
+              <a:t>A Critic network ‘critiques’ the generated action value in order to optimize a future ‘reward-to-go’ by propagating a temporal difference between consecutive estimates from the critic/prediction network.</a:t>
+            </a:r>
+          </a:p>
+          <a:p>
+            <a:endParaRPr lang="en-US" sz="2800" dirty="0">
+              <a:latin typeface="Amiri" panose="00000500000000000000" pitchFamily="2" charset="-78"/>
+              <a:ea typeface="Amiri" panose="00000500000000000000" pitchFamily="2" charset="-78"/>
+              <a:cs typeface="Amiri" panose="00000500000000000000" pitchFamily="2" charset="-78"/>
+            </a:endParaRPr>
+          </a:p>
+          <a:p>
+            <a:endParaRPr lang="en-US" sz="2800" dirty="0">
+              <a:latin typeface="Amiri" panose="00000500000000000000" pitchFamily="2" charset="-78"/>
+              <a:ea typeface="Amiri" panose="00000500000000000000" pitchFamily="2" charset="-78"/>
+              <a:cs typeface="Amiri" panose="00000500000000000000" pitchFamily="2" charset="-78"/>
+            </a:endParaRPr>
+          </a:p>
+        </p:txBody>
+      </p:sp>
+      <p:sp>
+        <p:nvSpPr>
+          <p:cNvPr id="6" name="Title 1">
+            <a:extLst>
+              <a:ext uri="{FF2B5EF4-FFF2-40B4-BE49-F238E27FC236}">
+                <a16:creationId xmlns:a16="http://schemas.microsoft.com/office/drawing/2014/main" id="{AF12F8E3-FB89-B639-7CB9-B860F0EEAEE2}"/>
+              </a:ext>
+            </a:extLst>
+          </p:cNvPr>
+          <p:cNvSpPr txBox="1">
+            <a:spLocks/>
+          </p:cNvSpPr>
+          <p:nvPr/>
+        </p:nvSpPr>
+        <p:spPr>
+          <a:xfrm>
+            <a:off x="1078051" y="184926"/>
+            <a:ext cx="11113949" cy="1137708"/>
+          </a:xfrm>
+          <a:prstGeom prst="rect">
+            <a:avLst/>
+          </a:prstGeom>
+        </p:spPr>
+        <p:txBody>
+          <a:bodyPr vert="horz" lIns="0" tIns="0" rIns="0" bIns="0" rtlCol="0" anchor="b" anchorCtr="1">
+            <a:noAutofit/>
+          </a:bodyPr>
+          <a:lstStyle>
+            <a:lvl1pPr algn="ctr" defTabSz="914400" rtl="0" eaLnBrk="1" latinLnBrk="0" hangingPunct="1">
+              <a:lnSpc>
+                <a:spcPct val="90000"/>
+              </a:lnSpc>
+              <a:spcBef>
+                <a:spcPct val="0"/>
+              </a:spcBef>
+              <a:buNone/>
+              <a:defRPr lang="en-US" sz="4400" kern="1200" spc="-150" dirty="0">
+                <a:solidFill>
+                  <a:schemeClr val="tx2"/>
+                </a:solidFill>
+                <a:latin typeface="Sitka Banner" pitchFamily="2" charset="0"/>
+                <a:ea typeface="+mj-ea"/>
+                <a:cs typeface="+mj-cs"/>
+              </a:defRPr>
+            </a:lvl1pPr>
+          </a:lstStyle>
+          <a:p>
+            <a:r>
+              <a:rPr lang="en-US" sz="4000" dirty="0">
+                <a:latin typeface="Arial Black" panose="020B0A04020102020204" pitchFamily="34" charset="0"/>
+              </a:rPr>
+              <a:t>Online Learning Control by Association and Reinforcement</a:t>
+            </a:r>
+            <a:endParaRPr lang="en-US" sz="4000" b="1" dirty="0">
+              <a:latin typeface="Arial Black" panose="020B0A04020102020204" pitchFamily="34" charset="0"/>
+            </a:endParaRPr>
+          </a:p>
+        </p:txBody>
+      </p:sp>
+      <p:grpSp>
+        <p:nvGrpSpPr>
+          <p:cNvPr id="7" name="Group 6">
+            <a:extLst>
+              <a:ext uri="{FF2B5EF4-FFF2-40B4-BE49-F238E27FC236}">
+                <a16:creationId xmlns:a16="http://schemas.microsoft.com/office/drawing/2014/main" id="{78CDD86D-0DA0-8C5E-D1B6-C68F283679B3}"/>
+              </a:ext>
+            </a:extLst>
+          </p:cNvPr>
+          <p:cNvGrpSpPr/>
+          <p:nvPr/>
+        </p:nvGrpSpPr>
+        <p:grpSpPr>
+          <a:xfrm>
+            <a:off x="2254961" y="1430543"/>
+            <a:ext cx="8647617" cy="449782"/>
+            <a:chOff x="1500603" y="2788093"/>
+            <a:chExt cx="8647617" cy="449782"/>
+          </a:xfrm>
+        </p:grpSpPr>
+        <p:sp>
+          <p:nvSpPr>
+            <p:cNvPr id="8" name="TextBox 7">
+              <a:extLst>
+                <a:ext uri="{FF2B5EF4-FFF2-40B4-BE49-F238E27FC236}">
+                  <a16:creationId xmlns:a16="http://schemas.microsoft.com/office/drawing/2014/main" id="{A8C88299-82C3-D0D6-C9DD-5747CA12BBFC}"/>
+                </a:ext>
+              </a:extLst>
+            </p:cNvPr>
+            <p:cNvSpPr txBox="1"/>
+            <p:nvPr/>
+          </p:nvSpPr>
+          <p:spPr>
+            <a:xfrm>
+              <a:off x="6657218" y="2788093"/>
+              <a:ext cx="3491002" cy="449782"/>
+            </a:xfrm>
+            <a:prstGeom prst="rect">
+              <a:avLst/>
+            </a:prstGeom>
+            <a:gradFill flip="none" rotWithShape="1">
+              <a:gsLst>
+                <a:gs pos="0">
+                  <a:schemeClr val="accent1">
+                    <a:lumMod val="5000"/>
+                    <a:lumOff val="95000"/>
+                  </a:schemeClr>
+                </a:gs>
+                <a:gs pos="86000">
+                  <a:schemeClr val="accent1">
+                    <a:lumMod val="45000"/>
+                    <a:lumOff val="55000"/>
+                  </a:schemeClr>
+                </a:gs>
+                <a:gs pos="83000">
+                  <a:schemeClr val="accent1">
+                    <a:lumMod val="45000"/>
+                    <a:lumOff val="55000"/>
+                  </a:schemeClr>
+                </a:gs>
+                <a:gs pos="100000">
+                  <a:schemeClr val="accent1">
+                    <a:lumMod val="30000"/>
+                    <a:lumOff val="70000"/>
+                  </a:schemeClr>
+                </a:gs>
+              </a:gsLst>
+              <a:lin ang="5400000" scaled="1"/>
+              <a:tileRect/>
+            </a:gradFill>
+          </p:spPr>
+          <p:txBody>
+            <a:bodyPr wrap="square" rtlCol="0">
+              <a:noAutofit/>
+            </a:bodyPr>
+            <a:lstStyle/>
+            <a:p>
+              <a:pPr algn="r"/>
+              <a:r>
+                <a:rPr lang="en-IN" b="1" i="1" dirty="0">
+                  <a:solidFill>
+                    <a:schemeClr val="bg2"/>
+                  </a:solidFill>
+                  <a:latin typeface="Arial" panose="020B0604020202020204" pitchFamily="34" charset="0"/>
+                  <a:cs typeface="Arial" panose="020B0604020202020204" pitchFamily="34" charset="0"/>
+                </a:rPr>
+                <a:t>Jennie Si and Yu-Tsung Wang</a:t>
+              </a:r>
+            </a:p>
+          </p:txBody>
+        </p:sp>
+        <p:sp>
+          <p:nvSpPr>
+            <p:cNvPr id="9" name="TextBox 8">
+              <a:extLst>
+                <a:ext uri="{FF2B5EF4-FFF2-40B4-BE49-F238E27FC236}">
+                  <a16:creationId xmlns:a16="http://schemas.microsoft.com/office/drawing/2014/main" id="{055575DC-40AE-EFBE-1AFB-D132F1BD2AD0}"/>
+                </a:ext>
+              </a:extLst>
+            </p:cNvPr>
+            <p:cNvSpPr txBox="1"/>
+            <p:nvPr/>
+          </p:nvSpPr>
+          <p:spPr>
+            <a:xfrm>
+              <a:off x="1500603" y="2788093"/>
+              <a:ext cx="5156615" cy="449782"/>
+            </a:xfrm>
+            <a:prstGeom prst="rect">
+              <a:avLst/>
+            </a:prstGeom>
+            <a:gradFill flip="none" rotWithShape="1">
+              <a:gsLst>
+                <a:gs pos="0">
+                  <a:schemeClr val="accent6">
+                    <a:lumMod val="5000"/>
+                    <a:lumOff val="95000"/>
+                  </a:schemeClr>
+                </a:gs>
+                <a:gs pos="74000">
+                  <a:schemeClr val="accent6">
+                    <a:lumMod val="45000"/>
+                    <a:lumOff val="55000"/>
+                  </a:schemeClr>
+                </a:gs>
+                <a:gs pos="83000">
+                  <a:schemeClr val="accent6">
+                    <a:lumMod val="45000"/>
+                    <a:lumOff val="55000"/>
+                  </a:schemeClr>
+                </a:gs>
+                <a:gs pos="100000">
+                  <a:schemeClr val="accent6">
+                    <a:lumMod val="30000"/>
+                    <a:lumOff val="70000"/>
+                  </a:schemeClr>
+                </a:gs>
+              </a:gsLst>
+              <a:lin ang="5400000" scaled="1"/>
+              <a:tileRect/>
+            </a:gradFill>
+          </p:spPr>
+          <p:txBody>
+            <a:bodyPr wrap="square" rtlCol="0">
+              <a:noAutofit/>
+            </a:bodyPr>
+            <a:lstStyle/>
+            <a:p>
+              <a:r>
+                <a:rPr lang="en-IN" b="1" i="1" dirty="0">
+                  <a:solidFill>
+                    <a:schemeClr val="accent2"/>
+                  </a:solidFill>
+                  <a:latin typeface="Arial" panose="020B0604020202020204" pitchFamily="34" charset="0"/>
+                  <a:cs typeface="Arial" panose="020B0604020202020204" pitchFamily="34" charset="0"/>
+                </a:rPr>
+                <a:t>IEEE Transactions on Neural Networks (2001)</a:t>
+              </a:r>
+            </a:p>
+          </p:txBody>
+        </p:sp>
+      </p:grpSp>
+    </p:spTree>
+    <p:extLst>
+      <p:ext uri="{BB962C8B-B14F-4D97-AF65-F5344CB8AC3E}">
+        <p14:creationId xmlns:p14="http://schemas.microsoft.com/office/powerpoint/2010/main" val="2614996855"/>
       </p:ext>
     </p:extLst>
   </p:cSld>

</xml_diff>